<commit_message>
update rpz & presentation
</commit_message>
<xml_diff>
--- a/docs/Presentation.pptx
+++ b/docs/Presentation.pptx
@@ -211,7 +211,7 @@
           <a:p>
             <a:fld id="{6E6D9DCE-A04C-4D8C-8931-135BCE43B3A4}" type="datetimeFigureOut">
               <a:rPr lang="ru-RU" smtClean="0"/>
-              <a:t>31.05.2022</a:t>
+              <a:t>05.06.2022</a:t>
             </a:fld>
             <a:endParaRPr lang="ru-RU"/>
           </a:p>
@@ -789,7 +789,7 @@
           <a:p>
             <a:fld id="{03C8B24E-9072-4A63-9CF3-2091FBEE0926}" type="datetime1">
               <a:rPr lang="ru-RU" smtClean="0"/>
-              <a:t>31.05.2022</a:t>
+              <a:t>05.06.2022</a:t>
             </a:fld>
             <a:endParaRPr lang="ru-RU"/>
           </a:p>
@@ -997,7 +997,7 @@
           <a:p>
             <a:fld id="{A2DF9016-3B0A-48DB-AA68-59A340F15C97}" type="datetime1">
               <a:rPr lang="ru-RU" smtClean="0"/>
-              <a:t>31.05.2022</a:t>
+              <a:t>05.06.2022</a:t>
             </a:fld>
             <a:endParaRPr lang="ru-RU"/>
           </a:p>
@@ -1253,7 +1253,7 @@
           <a:p>
             <a:fld id="{ED610CF0-5587-4445-8FAA-D1C14AACBF04}" type="datetime1">
               <a:rPr lang="ru-RU" smtClean="0"/>
-              <a:t>31.05.2022</a:t>
+              <a:t>05.06.2022</a:t>
             </a:fld>
             <a:endParaRPr lang="ru-RU"/>
           </a:p>
@@ -1427,7 +1427,7 @@
           <a:p>
             <a:fld id="{7D08D0F9-4486-4C0D-A4C3-9DF41EB36BAE}" type="datetime1">
               <a:rPr lang="ru-RU" smtClean="0"/>
-              <a:t>31.05.2022</a:t>
+              <a:t>05.06.2022</a:t>
             </a:fld>
             <a:endParaRPr lang="ru-RU"/>
           </a:p>
@@ -1770,7 +1770,7 @@
           <a:p>
             <a:fld id="{DCBAD543-8B65-47C4-9868-AF907E0250FD}" type="datetime1">
               <a:rPr lang="ru-RU" smtClean="0"/>
-              <a:t>31.05.2022</a:t>
+              <a:t>05.06.2022</a:t>
             </a:fld>
             <a:endParaRPr lang="ru-RU"/>
           </a:p>
@@ -2045,7 +2045,7 @@
           <a:p>
             <a:fld id="{D011704B-73F3-4C9F-8E51-784348AA7A81}" type="datetime1">
               <a:rPr lang="ru-RU" smtClean="0"/>
-              <a:t>31.05.2022</a:t>
+              <a:t>05.06.2022</a:t>
             </a:fld>
             <a:endParaRPr lang="ru-RU"/>
           </a:p>
@@ -2424,7 +2424,7 @@
           <a:p>
             <a:fld id="{0ECF71ED-13A9-4254-AC52-66FE8A8F1C23}" type="datetime1">
               <a:rPr lang="ru-RU" smtClean="0"/>
-              <a:t>31.05.2022</a:t>
+              <a:t>05.06.2022</a:t>
             </a:fld>
             <a:endParaRPr lang="ru-RU"/>
           </a:p>
@@ -2542,7 +2542,7 @@
           <a:p>
             <a:fld id="{D4D53A68-8569-454A-A05A-DDDF27B07A9D}" type="datetime1">
               <a:rPr lang="ru-RU" smtClean="0"/>
-              <a:t>31.05.2022</a:t>
+              <a:t>05.06.2022</a:t>
             </a:fld>
             <a:endParaRPr lang="ru-RU"/>
           </a:p>
@@ -2713,7 +2713,7 @@
           <a:p>
             <a:fld id="{DEBD3B65-C67D-4788-8DD4-B5879859E161}" type="datetime1">
               <a:rPr lang="ru-RU" smtClean="0"/>
-              <a:t>31.05.2022</a:t>
+              <a:t>05.06.2022</a:t>
             </a:fld>
             <a:endParaRPr lang="ru-RU"/>
           </a:p>
@@ -3067,7 +3067,7 @@
           <a:p>
             <a:fld id="{A7D08EAE-43AF-44C1-A7D9-E10A9ACFDA1E}" type="datetime1">
               <a:rPr lang="ru-RU" smtClean="0"/>
-              <a:t>31.05.2022</a:t>
+              <a:t>05.06.2022</a:t>
             </a:fld>
             <a:endParaRPr lang="ru-RU"/>
           </a:p>
@@ -3449,7 +3449,7 @@
           <a:p>
             <a:fld id="{4AC49E42-2C28-4AEE-A493-6691E23865B3}" type="datetime1">
               <a:rPr lang="ru-RU" smtClean="0"/>
-              <a:t>31.05.2022</a:t>
+              <a:t>05.06.2022</a:t>
             </a:fld>
             <a:endParaRPr lang="ru-RU"/>
           </a:p>
@@ -3736,7 +3736,7 @@
           <a:p>
             <a:fld id="{E56321EE-D23F-4780-B318-01CDAA890F27}" type="datetime1">
               <a:rPr lang="ru-RU" smtClean="0"/>
-              <a:t>31.05.2022</a:t>
+              <a:t>05.06.2022</a:t>
             </a:fld>
             <a:endParaRPr lang="ru-RU"/>
           </a:p>
@@ -4320,7 +4320,15 @@
                   <a:schemeClr val="tx1"/>
                 </a:solidFill>
               </a:rPr>
-              <a:t>Студент: Малышев Иван Алексеевич </a:t>
+              <a:t>Студент: Малышев Иван Алексеевич ИУ7-</a:t>
+            </a:r>
+            <a:r>
+              <a:rPr lang="en-US" sz="2000" b="1" cap="none" spc="0" dirty="0" smtClean="0">
+                <a:solidFill>
+                  <a:schemeClr val="tx1"/>
+                </a:solidFill>
+              </a:rPr>
+              <a:t>6</a:t>
             </a:r>
             <a:r>
               <a:rPr lang="ru-RU" sz="2000" b="1" cap="none" spc="0" dirty="0" smtClean="0">
@@ -4328,29 +4336,8 @@
                   <a:schemeClr val="tx1"/>
                 </a:solidFill>
               </a:rPr>
-              <a:t>ИУ7-</a:t>
-            </a:r>
-            <a:r>
-              <a:rPr lang="en-US" sz="2000" b="1" cap="none" spc="0" dirty="0" smtClean="0">
-                <a:solidFill>
-                  <a:schemeClr val="tx1"/>
-                </a:solidFill>
-              </a:rPr>
-              <a:t>6</a:t>
-            </a:r>
-            <a:r>
-              <a:rPr lang="ru-RU" sz="2000" b="1" cap="none" spc="0" dirty="0" smtClean="0">
-                <a:solidFill>
-                  <a:schemeClr val="tx1"/>
-                </a:solidFill>
-              </a:rPr>
               <a:t>1Б</a:t>
             </a:r>
-            <a:endParaRPr lang="ru-RU" sz="2000" b="1" cap="none" spc="0" dirty="0" smtClean="0">
-              <a:solidFill>
-                <a:schemeClr val="tx1"/>
-              </a:solidFill>
-            </a:endParaRPr>
           </a:p>
           <a:p>
             <a:r>
@@ -4853,18 +4840,28 @@
         </p:nvSpPr>
         <p:spPr/>
         <p:txBody>
-          <a:bodyPr/>
-          <a:lstStyle/>
-          <a:p>
-            <a:r>
-              <a:rPr lang="ru-RU" dirty="0" smtClean="0">
-                <a:solidFill>
-                  <a:schemeClr val="tx1"/>
-                </a:solidFill>
-              </a:rPr>
-              <a:t>Интерфейс программы</a:t>
-            </a:r>
-            <a:endParaRPr lang="ru-RU" dirty="0">
+          <a:bodyPr>
+            <a:normAutofit/>
+          </a:bodyPr>
+          <a:lstStyle/>
+          <a:p>
+            <a:r>
+              <a:rPr lang="ru-RU" sz="4000" dirty="0" smtClean="0">
+                <a:solidFill>
+                  <a:schemeClr val="tx1"/>
+                </a:solidFill>
+              </a:rPr>
+              <a:t>Интерфейс </a:t>
+            </a:r>
+            <a:r>
+              <a:rPr lang="ru-RU" sz="4000" dirty="0" smtClean="0">
+                <a:solidFill>
+                  <a:schemeClr val="tx1"/>
+                </a:solidFill>
+              </a:rPr>
+              <a:t>программы в режиме пользователя</a:t>
+            </a:r>
+            <a:endParaRPr lang="ru-RU" sz="4000" dirty="0">
               <a:solidFill>
                 <a:schemeClr val="tx1"/>
               </a:solidFill>
@@ -5023,18 +5020,28 @@
         </p:nvSpPr>
         <p:spPr/>
         <p:txBody>
-          <a:bodyPr/>
-          <a:lstStyle/>
-          <a:p>
-            <a:r>
-              <a:rPr lang="ru-RU" dirty="0" smtClean="0">
-                <a:solidFill>
-                  <a:schemeClr val="tx1"/>
-                </a:solidFill>
-              </a:rPr>
-              <a:t>Интерфейс программы</a:t>
-            </a:r>
-            <a:endParaRPr lang="ru-RU" dirty="0">
+          <a:bodyPr>
+            <a:normAutofit/>
+          </a:bodyPr>
+          <a:lstStyle/>
+          <a:p>
+            <a:r>
+              <a:rPr lang="ru-RU" sz="4000" dirty="0" smtClean="0">
+                <a:solidFill>
+                  <a:schemeClr val="tx1"/>
+                </a:solidFill>
+              </a:rPr>
+              <a:t>Интерфейс </a:t>
+            </a:r>
+            <a:r>
+              <a:rPr lang="ru-RU" sz="4000" dirty="0" smtClean="0">
+                <a:solidFill>
+                  <a:schemeClr val="tx1"/>
+                </a:solidFill>
+              </a:rPr>
+              <a:t>программы в режиме аналитика</a:t>
+            </a:r>
+            <a:endParaRPr lang="ru-RU" sz="4000" dirty="0">
               <a:solidFill>
                 <a:schemeClr val="tx1"/>
               </a:solidFill>
@@ -5193,18 +5200,28 @@
         </p:nvSpPr>
         <p:spPr/>
         <p:txBody>
-          <a:bodyPr/>
-          <a:lstStyle/>
-          <a:p>
-            <a:r>
-              <a:rPr lang="ru-RU" dirty="0" smtClean="0">
-                <a:solidFill>
-                  <a:schemeClr val="tx1"/>
-                </a:solidFill>
-              </a:rPr>
-              <a:t>Интерфейс программы</a:t>
-            </a:r>
-            <a:endParaRPr lang="ru-RU" dirty="0">
+          <a:bodyPr>
+            <a:normAutofit/>
+          </a:bodyPr>
+          <a:lstStyle/>
+          <a:p>
+            <a:r>
+              <a:rPr lang="ru-RU" sz="3700" dirty="0" smtClean="0">
+                <a:solidFill>
+                  <a:schemeClr val="tx1"/>
+                </a:solidFill>
+              </a:rPr>
+              <a:t>Интерфейс </a:t>
+            </a:r>
+            <a:r>
+              <a:rPr lang="ru-RU" sz="3700" dirty="0" smtClean="0">
+                <a:solidFill>
+                  <a:schemeClr val="tx1"/>
+                </a:solidFill>
+              </a:rPr>
+              <a:t>программы в режиме администратора</a:t>
+            </a:r>
+            <a:endParaRPr lang="ru-RU" sz="3700" dirty="0">
               <a:solidFill>
                 <a:schemeClr val="tx1"/>
               </a:solidFill>
@@ -5382,9 +5399,38 @@
           </a:p>
         </p:txBody>
       </p:sp>
+      <p:sp>
+        <p:nvSpPr>
+          <p:cNvPr id="5" name="Номер слайда 4"/>
+          <p:cNvSpPr>
+            <a:spLocks noGrp="1"/>
+          </p:cNvSpPr>
+          <p:nvPr>
+            <p:ph type="sldNum" sz="quarter" idx="12"/>
+          </p:nvPr>
+        </p:nvSpPr>
+        <p:spPr/>
+        <p:txBody>
+          <a:bodyPr/>
+          <a:lstStyle/>
+          <a:p>
+            <a:fld id="{C4F09F00-B2EF-4E92-A50A-EB2934570B6C}" type="slidenum">
+              <a:rPr lang="ru-RU" sz="1800" smtClean="0">
+                <a:latin typeface="Times New Roman" panose="02020603050405020304" pitchFamily="18" charset="0"/>
+                <a:cs typeface="Times New Roman" panose="02020603050405020304" pitchFamily="18" charset="0"/>
+              </a:rPr>
+              <a:t>13</a:t>
+            </a:fld>
+            <a:endParaRPr lang="ru-RU" dirty="0">
+              <a:latin typeface="Times New Roman" panose="02020603050405020304" pitchFamily="18" charset="0"/>
+              <a:cs typeface="Times New Roman" panose="02020603050405020304" pitchFamily="18" charset="0"/>
+            </a:endParaRPr>
+          </a:p>
+        </p:txBody>
+      </p:sp>
       <p:pic>
         <p:nvPicPr>
-          <p:cNvPr id="6" name="Объект 5"/>
+          <p:cNvPr id="4" name="Объект 3"/>
           <p:cNvPicPr>
             <a:picLocks noGrp="1" noChangeAspect="1"/>
           </p:cNvPicPr>
@@ -5393,50 +5439,24 @@
           </p:nvPr>
         </p:nvPicPr>
         <p:blipFill>
-          <a:blip r:embed="rId2"/>
+          <a:blip r:embed="rId2">
+            <a:extLst>
+              <a:ext uri="{28A0092B-C50C-407E-A947-70E740481C1C}">
+                <a14:useLocalDpi xmlns:a14="http://schemas.microsoft.com/office/drawing/2010/main" val="0"/>
+              </a:ext>
+            </a:extLst>
+          </a:blip>
           <a:stretch>
             <a:fillRect/>
           </a:stretch>
         </p:blipFill>
         <p:spPr>
           <a:xfrm>
-            <a:off x="4660292" y="1805074"/>
-            <a:ext cx="2932376" cy="4022725"/>
+            <a:off x="2329556" y="1821550"/>
+            <a:ext cx="7593848" cy="4022725"/>
           </a:xfrm>
-          <a:prstGeom prst="rect">
-            <a:avLst/>
-          </a:prstGeom>
         </p:spPr>
       </p:pic>
-      <p:sp>
-        <p:nvSpPr>
-          <p:cNvPr id="5" name="Номер слайда 4"/>
-          <p:cNvSpPr>
-            <a:spLocks noGrp="1"/>
-          </p:cNvSpPr>
-          <p:nvPr>
-            <p:ph type="sldNum" sz="quarter" idx="12"/>
-          </p:nvPr>
-        </p:nvSpPr>
-        <p:spPr/>
-        <p:txBody>
-          <a:bodyPr/>
-          <a:lstStyle/>
-          <a:p>
-            <a:fld id="{C4F09F00-B2EF-4E92-A50A-EB2934570B6C}" type="slidenum">
-              <a:rPr lang="ru-RU" sz="1800" smtClean="0">
-                <a:latin typeface="Times New Roman" panose="02020603050405020304" pitchFamily="18" charset="0"/>
-                <a:cs typeface="Times New Roman" panose="02020603050405020304" pitchFamily="18" charset="0"/>
-              </a:rPr>
-              <a:t>13</a:t>
-            </a:fld>
-            <a:endParaRPr lang="ru-RU" dirty="0">
-              <a:latin typeface="Times New Roman" panose="02020603050405020304" pitchFamily="18" charset="0"/>
-              <a:cs typeface="Times New Roman" panose="02020603050405020304" pitchFamily="18" charset="0"/>
-            </a:endParaRPr>
-          </a:p>
-        </p:txBody>
-      </p:sp>
     </p:spTree>
     <p:extLst>
       <p:ext uri="{BB962C8B-B14F-4D97-AF65-F5344CB8AC3E}">
@@ -5525,12 +5545,63 @@
               <a:buChar char="•"/>
             </a:pPr>
             <a:r>
+              <a:rPr lang="ru-RU" dirty="0">
+                <a:solidFill>
+                  <a:schemeClr val="tx1"/>
+                </a:solidFill>
+              </a:rPr>
+              <a:t>Б</a:t>
+            </a:r>
+            <a:r>
               <a:rPr lang="ru-RU" dirty="0" smtClean="0">
                 <a:solidFill>
                   <a:schemeClr val="tx1"/>
                 </a:solidFill>
               </a:rPr>
-              <a:t>Разработана база данных для хранения информации о магазинах, товарах в них, товарных чека и их позиций и истории цен товаров.</a:t>
+              <a:t>ыл </a:t>
+            </a:r>
+            <a:r>
+              <a:rPr lang="ru-RU" dirty="0">
+                <a:solidFill>
+                  <a:schemeClr val="tx1"/>
+                </a:solidFill>
+              </a:rPr>
+              <a:t>проведен анализ предметной области, описана ролевая модель, рассмотрены существующие СУБД и методы построения линии </a:t>
+            </a:r>
+            <a:r>
+              <a:rPr lang="ru-RU" dirty="0" smtClean="0">
+                <a:solidFill>
+                  <a:schemeClr val="tx1"/>
+                </a:solidFill>
+              </a:rPr>
+              <a:t>тренда.</a:t>
+            </a:r>
+            <a:endParaRPr lang="en-US" dirty="0" smtClean="0">
+              <a:solidFill>
+                <a:schemeClr val="tx1"/>
+              </a:solidFill>
+            </a:endParaRPr>
+          </a:p>
+          <a:p>
+            <a:pPr lvl="1" algn="just">
+              <a:buFont typeface="Arial" panose="020B0604020202020204" pitchFamily="34" charset="0"/>
+              <a:buChar char="•"/>
+            </a:pPr>
+            <a:r>
+              <a:rPr lang="ru-RU" dirty="0" smtClean="0">
+                <a:solidFill>
+                  <a:schemeClr val="tx1"/>
+                </a:solidFill>
+              </a:rPr>
+              <a:t>Разработана </a:t>
+            </a:r>
+            <a:r>
+              <a:rPr lang="ru-RU" dirty="0" smtClean="0">
+                <a:solidFill>
+                  <a:schemeClr val="tx1"/>
+                </a:solidFill>
+              </a:rPr>
+              <a:t>база данных для хранения информации о магазинах, товарах в них, товарных чека и их позиций и истории цен товаров.</a:t>
             </a:r>
             <a:endParaRPr lang="ru-RU" dirty="0">
               <a:solidFill>
@@ -5744,7 +5815,31 @@
                   <a:schemeClr val="tx1"/>
                 </a:solidFill>
               </a:rPr>
-              <a:t>Реализация более качественной модели прогнозирования цен на товары в магазинах.</a:t>
+              <a:t>Реализация более </a:t>
+            </a:r>
+            <a:r>
+              <a:rPr lang="ru-RU" sz="1600" dirty="0" smtClean="0">
+                <a:solidFill>
+                  <a:schemeClr val="tx1"/>
+                </a:solidFill>
+              </a:rPr>
+              <a:t>устойчивой</a:t>
+            </a:r>
+            <a:r>
+              <a:rPr lang="ru-RU" sz="1600" dirty="0" smtClean="0">
+                <a:solidFill>
+                  <a:schemeClr val="tx1"/>
+                </a:solidFill>
+              </a:rPr>
+              <a:t> </a:t>
+            </a:r>
+            <a:r>
+              <a:rPr lang="ru-RU" sz="1600" dirty="0" smtClean="0">
+                <a:solidFill>
+                  <a:schemeClr val="tx1"/>
+                </a:solidFill>
+              </a:rPr>
+              <a:t>модели прогнозирования цен на товары в магазинах.</a:t>
             </a:r>
             <a:endParaRPr lang="ru-RU" sz="1600" dirty="0">
               <a:solidFill>
@@ -5884,15 +5979,7 @@
                   <a:schemeClr val="tx1"/>
                 </a:solidFill>
               </a:rPr>
-              <a:t>: </a:t>
-            </a:r>
-            <a:r>
-              <a:rPr lang="ru-RU" dirty="0">
-                <a:solidFill>
-                  <a:schemeClr val="tx1"/>
-                </a:solidFill>
-              </a:rPr>
-              <a:t>реализовать базу данных, хранящую информацию о покупателях, магазинах, ассортименте товаров в магазинах и историях цен товаров в них, и программное обеспечение для работы с информацией из этой базы данных, а также прогнозирования цен на товары в магазинах посредством построения линии тренда на основе истории цен</a:t>
+              <a:t>: реализовать базу данных, хранящую информацию о покупателях, магазинах, ассортименте товаров в магазинах и историях цен товаров в них, и программное обеспечение для работы с информацией из этой базы данных, а также прогнозирования цен на товары в магазинах посредством построения линии тренда на основе истории цен</a:t>
             </a:r>
             <a:r>
               <a:rPr lang="ru-RU" dirty="0" smtClean="0">
@@ -5941,7 +6028,7 @@
                   <a:schemeClr val="tx1"/>
                 </a:solidFill>
               </a:rPr>
-              <a:t>варианты представления </a:t>
+              <a:t>предметную область решаемой задачи, выделить сущности, их атрибуты и связи, разработать модель предметной </a:t>
             </a:r>
             <a:r>
               <a:rPr lang="ru-RU" dirty="0" smtClean="0">
@@ -5949,69 +6036,7 @@
                   <a:schemeClr val="tx1"/>
                 </a:solidFill>
               </a:rPr>
-              <a:t>данных, </a:t>
-            </a:r>
-            <a:r>
-              <a:rPr lang="ru-RU" dirty="0">
-                <a:solidFill>
-                  <a:schemeClr val="tx1"/>
-                </a:solidFill>
-              </a:rPr>
-              <a:t>системы управления базами данных, методы построения линии тренда и выбрать из них </a:t>
-            </a:r>
-            <a:r>
-              <a:rPr lang="ru-RU" dirty="0" smtClean="0">
-                <a:solidFill>
-                  <a:schemeClr val="tx1"/>
-                </a:solidFill>
-              </a:rPr>
-              <a:t>подходящие </a:t>
-            </a:r>
-            <a:r>
-              <a:rPr lang="ru-RU" dirty="0">
-                <a:solidFill>
-                  <a:schemeClr val="tx1"/>
-                </a:solidFill>
-              </a:rPr>
-              <a:t>для решения </a:t>
-            </a:r>
-            <a:r>
-              <a:rPr lang="ru-RU" dirty="0" smtClean="0">
-                <a:solidFill>
-                  <a:schemeClr val="tx1"/>
-                </a:solidFill>
-              </a:rPr>
-              <a:t>задачи;</a:t>
-            </a:r>
-          </a:p>
-          <a:p>
-            <a:pPr lvl="1" algn="just">
-              <a:buFont typeface="Arial" panose="020B0604020202020204" pitchFamily="34" charset="0"/>
-              <a:buChar char="•"/>
-            </a:pPr>
-            <a:r>
-              <a:rPr lang="ru-RU" dirty="0" smtClean="0">
-                <a:solidFill>
-                  <a:schemeClr val="tx1"/>
-                </a:solidFill>
-              </a:rPr>
-              <a:t>Спроектировать и реализовать </a:t>
-            </a:r>
-            <a:r>
-              <a:rPr lang="ru-RU" dirty="0">
-                <a:solidFill>
-                  <a:schemeClr val="tx1"/>
-                </a:solidFill>
-              </a:rPr>
-              <a:t>базу данных, описать её сущности и </a:t>
-            </a:r>
-            <a:r>
-              <a:rPr lang="ru-RU" dirty="0" smtClean="0">
-                <a:solidFill>
-                  <a:schemeClr val="tx1"/>
-                </a:solidFill>
-              </a:rPr>
-              <a:t>связи;</a:t>
+              <a:t>области;</a:t>
             </a:r>
             <a:endParaRPr lang="ru-RU" dirty="0" smtClean="0">
               <a:solidFill>
@@ -6030,6 +6055,98 @@
                   <a:schemeClr val="tx1"/>
                 </a:solidFill>
               </a:rPr>
+              <a:t>Проанализировать </a:t>
+            </a:r>
+            <a:r>
+              <a:rPr lang="ru-RU" dirty="0">
+                <a:solidFill>
+                  <a:schemeClr val="tx1"/>
+                </a:solidFill>
+              </a:rPr>
+              <a:t>варианты представления </a:t>
+            </a:r>
+            <a:r>
+              <a:rPr lang="ru-RU" dirty="0" smtClean="0">
+                <a:solidFill>
+                  <a:schemeClr val="tx1"/>
+                </a:solidFill>
+              </a:rPr>
+              <a:t>данных, </a:t>
+            </a:r>
+            <a:r>
+              <a:rPr lang="ru-RU" dirty="0">
+                <a:solidFill>
+                  <a:schemeClr val="tx1"/>
+                </a:solidFill>
+              </a:rPr>
+              <a:t>системы управления базами данных, методы построения линии тренда и выбрать из них </a:t>
+            </a:r>
+            <a:r>
+              <a:rPr lang="ru-RU" dirty="0" smtClean="0">
+                <a:solidFill>
+                  <a:schemeClr val="tx1"/>
+                </a:solidFill>
+              </a:rPr>
+              <a:t>подходящие </a:t>
+            </a:r>
+            <a:r>
+              <a:rPr lang="ru-RU" dirty="0">
+                <a:solidFill>
+                  <a:schemeClr val="tx1"/>
+                </a:solidFill>
+              </a:rPr>
+              <a:t>для решения </a:t>
+            </a:r>
+            <a:r>
+              <a:rPr lang="ru-RU" dirty="0" smtClean="0">
+                <a:solidFill>
+                  <a:schemeClr val="tx1"/>
+                </a:solidFill>
+              </a:rPr>
+              <a:t>задачи;</a:t>
+            </a:r>
+          </a:p>
+          <a:p>
+            <a:pPr lvl="1" algn="just">
+              <a:buFont typeface="Arial" panose="020B0604020202020204" pitchFamily="34" charset="0"/>
+              <a:buChar char="•"/>
+            </a:pPr>
+            <a:r>
+              <a:rPr lang="ru-RU" dirty="0" smtClean="0">
+                <a:solidFill>
+                  <a:schemeClr val="tx1"/>
+                </a:solidFill>
+              </a:rPr>
+              <a:t>Спроектировать и реализовать </a:t>
+            </a:r>
+            <a:r>
+              <a:rPr lang="ru-RU" dirty="0">
+                <a:solidFill>
+                  <a:schemeClr val="tx1"/>
+                </a:solidFill>
+              </a:rPr>
+              <a:t>базу данных, описать её сущности и </a:t>
+            </a:r>
+            <a:r>
+              <a:rPr lang="ru-RU" dirty="0" smtClean="0">
+                <a:solidFill>
+                  <a:schemeClr val="tx1"/>
+                </a:solidFill>
+              </a:rPr>
+              <a:t>связи;</a:t>
+            </a:r>
+          </a:p>
+          <a:p>
+            <a:pPr lvl="1" algn="just">
+              <a:buFont typeface="Arial" panose="020B0604020202020204" pitchFamily="34" charset="0"/>
+              <a:buChar char="•"/>
+            </a:pPr>
+            <a:r>
+              <a:rPr lang="ru-RU" dirty="0" smtClean="0">
+                <a:solidFill>
+                  <a:schemeClr val="tx1"/>
+                </a:solidFill>
+              </a:rPr>
               <a:t>Реализовать приложение </a:t>
             </a:r>
             <a:r>
@@ -6056,11 +6173,6 @@
               </a:rPr>
               <a:t>построения линии тренда для прогнозирования цен на товары в магазинах.</a:t>
             </a:r>
-            <a:endParaRPr lang="ru-RU" dirty="0">
-              <a:solidFill>
-                <a:schemeClr val="tx1"/>
-              </a:solidFill>
-            </a:endParaRPr>
           </a:p>
         </p:txBody>
       </p:sp>
@@ -6159,7 +6271,15 @@
                   <a:schemeClr val="tx1"/>
                 </a:solidFill>
               </a:rPr>
-              <a:t>диаграмма сущностей</a:t>
+              <a:t>диаграмма </a:t>
+            </a:r>
+            <a:r>
+              <a:rPr lang="ru-RU" dirty="0">
+                <a:solidFill>
+                  <a:schemeClr val="tx1"/>
+                </a:solidFill>
+              </a:rPr>
+              <a:t>моделируемой области</a:t>
             </a:r>
             <a:endParaRPr lang="ru-RU" dirty="0">
               <a:solidFill>
@@ -6169,9 +6289,77 @@
           </a:p>
         </p:txBody>
       </p:sp>
+      <p:sp>
+        <p:nvSpPr>
+          <p:cNvPr id="4" name="Номер слайда 3"/>
+          <p:cNvSpPr>
+            <a:spLocks noGrp="1"/>
+          </p:cNvSpPr>
+          <p:nvPr>
+            <p:ph type="sldNum" sz="quarter" idx="12"/>
+          </p:nvPr>
+        </p:nvSpPr>
+        <p:spPr/>
+        <p:txBody>
+          <a:bodyPr/>
+          <a:lstStyle/>
+          <a:p>
+            <a:fld id="{C4F09F00-B2EF-4E92-A50A-EB2934570B6C}" type="slidenum">
+              <a:rPr lang="ru-RU" sz="1800" smtClean="0">
+                <a:latin typeface="Times New Roman" panose="02020603050405020304" pitchFamily="18" charset="0"/>
+                <a:cs typeface="Times New Roman" panose="02020603050405020304" pitchFamily="18" charset="0"/>
+              </a:rPr>
+              <a:t>3</a:t>
+            </a:fld>
+            <a:endParaRPr lang="ru-RU" sz="1800" dirty="0">
+              <a:latin typeface="Times New Roman" panose="02020603050405020304" pitchFamily="18" charset="0"/>
+              <a:cs typeface="Times New Roman" panose="02020603050405020304" pitchFamily="18" charset="0"/>
+            </a:endParaRPr>
+          </a:p>
+        </p:txBody>
+      </p:sp>
+      <p:sp>
+        <p:nvSpPr>
+          <p:cNvPr id="7" name="AutoShape 8" descr="https://games.mail.ru/hotbox/content_files/gallery/1a/4f/invizimals_screenshot_589d1ea8.jpeg"/>
+          <p:cNvSpPr>
+            <a:spLocks noChangeAspect="1" noChangeArrowheads="1"/>
+          </p:cNvSpPr>
+          <p:nvPr/>
+        </p:nvSpPr>
+        <p:spPr bwMode="auto">
+          <a:xfrm>
+            <a:off x="155575" y="-144463"/>
+            <a:ext cx="304800" cy="304801"/>
+          </a:xfrm>
+          <a:prstGeom prst="rect">
+            <a:avLst/>
+          </a:prstGeom>
+          <a:noFill/>
+          <a:extLst>
+            <a:ext uri="{909E8E84-426E-40DD-AFC4-6F175D3DCCD1}">
+              <a14:hiddenFill xmlns:a14="http://schemas.microsoft.com/office/drawing/2010/main">
+                <a:solidFill>
+                  <a:srgbClr val="FFFFFF"/>
+                </a:solidFill>
+              </a14:hiddenFill>
+            </a:ext>
+          </a:extLst>
+        </p:spPr>
+        <p:txBody>
+          <a:bodyPr vert="horz" wrap="square" lIns="91440" tIns="45720" rIns="91440" bIns="45720" numCol="1" anchor="t" anchorCtr="0" compatLnSpc="1">
+            <a:prstTxWarp prst="textNoShape">
+              <a:avLst/>
+            </a:prstTxWarp>
+          </a:bodyPr>
+          <a:lstStyle/>
+          <a:p>
+            <a:endParaRPr lang="ru-RU"/>
+          </a:p>
+        </p:txBody>
+      </p:sp>
       <p:pic>
         <p:nvPicPr>
-          <p:cNvPr id="5" name="Объект 4"/>
+          <p:cNvPr id="9" name="Объект 8"/>
           <p:cNvPicPr>
             <a:picLocks noGrp="1" noChangeAspect="1"/>
           </p:cNvPicPr>
@@ -6193,79 +6381,11 @@
         </p:blipFill>
         <p:spPr>
           <a:xfrm>
-            <a:off x="3954163" y="1829787"/>
-            <a:ext cx="4349096" cy="4364854"/>
+            <a:off x="3918091" y="1795025"/>
+            <a:ext cx="4416777" cy="4432781"/>
           </a:xfrm>
         </p:spPr>
       </p:pic>
-      <p:sp>
-        <p:nvSpPr>
-          <p:cNvPr id="4" name="Номер слайда 3"/>
-          <p:cNvSpPr>
-            <a:spLocks noGrp="1"/>
-          </p:cNvSpPr>
-          <p:nvPr>
-            <p:ph type="sldNum" sz="quarter" idx="12"/>
-          </p:nvPr>
-        </p:nvSpPr>
-        <p:spPr/>
-        <p:txBody>
-          <a:bodyPr/>
-          <a:lstStyle/>
-          <a:p>
-            <a:fld id="{C4F09F00-B2EF-4E92-A50A-EB2934570B6C}" type="slidenum">
-              <a:rPr lang="ru-RU" sz="1800" smtClean="0">
-                <a:latin typeface="Times New Roman" panose="02020603050405020304" pitchFamily="18" charset="0"/>
-                <a:cs typeface="Times New Roman" panose="02020603050405020304" pitchFamily="18" charset="0"/>
-              </a:rPr>
-              <a:t>3</a:t>
-            </a:fld>
-            <a:endParaRPr lang="ru-RU" sz="1800" dirty="0">
-              <a:latin typeface="Times New Roman" panose="02020603050405020304" pitchFamily="18" charset="0"/>
-              <a:cs typeface="Times New Roman" panose="02020603050405020304" pitchFamily="18" charset="0"/>
-            </a:endParaRPr>
-          </a:p>
-        </p:txBody>
-      </p:sp>
-      <p:sp>
-        <p:nvSpPr>
-          <p:cNvPr id="7" name="AutoShape 8" descr="https://games.mail.ru/hotbox/content_files/gallery/1a/4f/invizimals_screenshot_589d1ea8.jpeg"/>
-          <p:cNvSpPr>
-            <a:spLocks noChangeAspect="1" noChangeArrowheads="1"/>
-          </p:cNvSpPr>
-          <p:nvPr/>
-        </p:nvSpPr>
-        <p:spPr bwMode="auto">
-          <a:xfrm>
-            <a:off x="155575" y="-144463"/>
-            <a:ext cx="304800" cy="304801"/>
-          </a:xfrm>
-          <a:prstGeom prst="rect">
-            <a:avLst/>
-          </a:prstGeom>
-          <a:noFill/>
-          <a:extLst>
-            <a:ext uri="{909E8E84-426E-40DD-AFC4-6F175D3DCCD1}">
-              <a14:hiddenFill xmlns:a14="http://schemas.microsoft.com/office/drawing/2010/main">
-                <a:solidFill>
-                  <a:srgbClr val="FFFFFF"/>
-                </a:solidFill>
-              </a14:hiddenFill>
-            </a:ext>
-          </a:extLst>
-        </p:spPr>
-        <p:txBody>
-          <a:bodyPr vert="horz" wrap="square" lIns="91440" tIns="45720" rIns="91440" bIns="45720" numCol="1" anchor="t" anchorCtr="0" compatLnSpc="1">
-            <a:prstTxWarp prst="textNoShape">
-              <a:avLst/>
-            </a:prstTxWarp>
-          </a:bodyPr>
-          <a:lstStyle/>
-          <a:p>
-            <a:endParaRPr lang="ru-RU"/>
-          </a:p>
-        </p:txBody>
-      </p:sp>
     </p:spTree>
     <p:extLst>
       <p:ext uri="{BB962C8B-B14F-4D97-AF65-F5344CB8AC3E}">
@@ -6449,18 +6569,20 @@
         </p:nvSpPr>
         <p:spPr/>
         <p:txBody>
-          <a:bodyPr/>
-          <a:lstStyle/>
-          <a:p>
-            <a:r>
-              <a:rPr lang="ru-RU" dirty="0">
-                <a:solidFill>
-                  <a:schemeClr val="tx1"/>
-                </a:solidFill>
-              </a:rPr>
-              <a:t>Обзор существующих СУБД</a:t>
-            </a:r>
-            <a:endParaRPr lang="ru-RU" dirty="0">
+          <a:bodyPr>
+            <a:normAutofit/>
+          </a:bodyPr>
+          <a:lstStyle/>
+          <a:p>
+            <a:r>
+              <a:rPr lang="ru-RU" sz="4400" dirty="0" smtClean="0">
+                <a:solidFill>
+                  <a:schemeClr val="tx1"/>
+                </a:solidFill>
+              </a:rPr>
+              <a:t>Классификация СУБД по модели данных</a:t>
+            </a:r>
+            <a:endParaRPr lang="ru-RU" sz="4400" dirty="0">
               <a:solidFill>
                 <a:schemeClr val="tx1"/>
               </a:solidFill>
@@ -6508,9 +6630,9 @@
             </a:r>
           </a:p>
           <a:p>
-            <a:pPr marL="726948" lvl="2" indent="-342900">
+            <a:pPr marL="1024128" lvl="3" indent="-457200">
               <a:buFont typeface="+mj-lt"/>
-              <a:buAutoNum type="arabicPeriod"/>
+              <a:buAutoNum type="arabicParenR"/>
             </a:pPr>
             <a:r>
               <a:rPr lang="ru-RU" sz="2000" dirty="0" smtClean="0">
@@ -6518,13 +6640,13 @@
                   <a:schemeClr val="tx1"/>
                 </a:solidFill>
               </a:rPr>
-              <a:t>Реляционные</a:t>
-            </a:r>
-          </a:p>
-          <a:p>
-            <a:pPr marL="726948" lvl="2" indent="-342900">
+              <a:t>Иерархические</a:t>
+            </a:r>
+          </a:p>
+          <a:p>
+            <a:pPr marL="909828" lvl="3" indent="-342900">
               <a:buFont typeface="+mj-lt"/>
-              <a:buAutoNum type="arabicPeriod"/>
+              <a:buAutoNum type="arabicParenR"/>
             </a:pPr>
             <a:r>
               <a:rPr lang="ru-RU" sz="2000" dirty="0" smtClean="0">
@@ -6532,7 +6654,7 @@
                   <a:schemeClr val="tx1"/>
                 </a:solidFill>
               </a:rPr>
-              <a:t>Постреляционные</a:t>
+              <a:t>  Сетевые</a:t>
             </a:r>
             <a:endParaRPr lang="ru-RU" sz="2000" dirty="0" smtClean="0">
               <a:solidFill>
@@ -6541,7 +6663,88 @@
             </a:endParaRPr>
           </a:p>
           <a:p>
-            <a:pPr lvl="1"/>
+            <a:pPr marL="726948" lvl="2" indent="-342900">
+              <a:buFont typeface="+mj-lt"/>
+              <a:buAutoNum type="arabicPeriod"/>
+            </a:pPr>
+            <a:r>
+              <a:rPr lang="ru-RU" sz="2000" dirty="0" smtClean="0">
+                <a:solidFill>
+                  <a:schemeClr val="tx1"/>
+                </a:solidFill>
+              </a:rPr>
+              <a:t>Реляционные</a:t>
+            </a:r>
+          </a:p>
+          <a:p>
+            <a:pPr marL="726948" lvl="2" indent="-342900">
+              <a:buFont typeface="+mj-lt"/>
+              <a:buAutoNum type="arabicPeriod"/>
+            </a:pPr>
+            <a:r>
+              <a:rPr lang="ru-RU" sz="2000" dirty="0" smtClean="0">
+                <a:solidFill>
+                  <a:schemeClr val="tx1"/>
+                </a:solidFill>
+              </a:rPr>
+              <a:t>Постреляционные</a:t>
+            </a:r>
+          </a:p>
+          <a:p>
+            <a:pPr marL="909828" lvl="3" indent="-342900">
+              <a:buFont typeface="+mj-lt"/>
+              <a:buAutoNum type="arabicParenR"/>
+            </a:pPr>
+            <a:r>
+              <a:rPr lang="ru-RU" sz="2000" dirty="0" smtClean="0">
+                <a:solidFill>
+                  <a:schemeClr val="tx1"/>
+                </a:solidFill>
+              </a:rPr>
+              <a:t>  Объектно-ориентированные</a:t>
+            </a:r>
+            <a:endParaRPr lang="ru-RU" sz="2000" dirty="0">
+              <a:solidFill>
+                <a:schemeClr val="tx1"/>
+              </a:solidFill>
+            </a:endParaRPr>
+          </a:p>
+          <a:p>
+            <a:pPr marL="1024128" lvl="3" indent="-457200">
+              <a:buFont typeface="+mj-lt"/>
+              <a:buAutoNum type="arabicParenR"/>
+            </a:pPr>
+            <a:r>
+              <a:rPr lang="ru-RU" sz="2000" dirty="0">
+                <a:solidFill>
+                  <a:schemeClr val="tx1"/>
+                </a:solidFill>
+              </a:rPr>
+              <a:t>Объектно-реляционные</a:t>
+            </a:r>
+          </a:p>
+          <a:p>
+            <a:pPr marL="566928" lvl="3" indent="0">
+              <a:buNone/>
+            </a:pPr>
+            <a:endParaRPr lang="ru-RU" sz="2000" dirty="0" smtClean="0">
+              <a:solidFill>
+                <a:schemeClr val="tx1"/>
+              </a:solidFill>
+            </a:endParaRPr>
+          </a:p>
+          <a:p>
+            <a:pPr marL="566928" lvl="3" indent="0">
+              <a:buNone/>
+            </a:pPr>
+            <a:r>
+              <a:rPr lang="ru-RU" sz="2000" dirty="0" smtClean="0">
+                <a:solidFill>
+                  <a:schemeClr val="tx1"/>
+                </a:solidFill>
+              </a:rPr>
+              <a:t>	</a:t>
+            </a:r>
             <a:endParaRPr lang="ru-RU" dirty="0" smtClean="0"/>
           </a:p>
           <a:p>
@@ -6960,20 +7163,12 @@
           <a:lstStyle/>
           <a:p>
             <a:r>
-              <a:rPr lang="en-US" dirty="0" smtClean="0">
-                <a:solidFill>
-                  <a:schemeClr val="tx1"/>
-                </a:solidFill>
-              </a:rPr>
-              <a:t>ER-</a:t>
-            </a:r>
-            <a:r>
               <a:rPr lang="ru-RU" dirty="0" smtClean="0">
                 <a:solidFill>
                   <a:schemeClr val="tx1"/>
                 </a:solidFill>
               </a:rPr>
-              <a:t>диаграмма сущностей БД</a:t>
+              <a:t>Схема БД</a:t>
             </a:r>
             <a:endParaRPr lang="ru-RU" dirty="0">
               <a:solidFill>
@@ -7294,8 +7489,204 @@
                   <a:schemeClr val="tx1"/>
                 </a:solidFill>
               </a:rPr>
-              <a:t>Хранимые функции для выборки</a:t>
-            </a:r>
+              <a:t>Хранимые функции для </a:t>
+            </a:r>
+            <a:r>
+              <a:rPr lang="ru-RU" dirty="0" smtClean="0">
+                <a:solidFill>
+                  <a:schemeClr val="tx1"/>
+                </a:solidFill>
+              </a:rPr>
+              <a:t>выборки</a:t>
+            </a:r>
+          </a:p>
+          <a:p>
+            <a:pPr lvl="2">
+              <a:buFont typeface="Arial" panose="020B0604020202020204" pitchFamily="34" charset="0"/>
+              <a:buChar char="•"/>
+            </a:pPr>
+            <a:r>
+              <a:rPr lang="en-US" dirty="0" err="1" smtClean="0">
+                <a:solidFill>
+                  <a:schemeClr val="tx1"/>
+                </a:solidFill>
+              </a:rPr>
+              <a:t>get_products_by_shopid</a:t>
+            </a:r>
+            <a:r>
+              <a:rPr lang="en-US" dirty="0" smtClean="0">
+                <a:solidFill>
+                  <a:schemeClr val="tx1"/>
+                </a:solidFill>
+              </a:rPr>
+              <a:t>(</a:t>
+            </a:r>
+            <a:r>
+              <a:rPr lang="en-US" dirty="0" err="1" smtClean="0">
+                <a:solidFill>
+                  <a:schemeClr val="tx1"/>
+                </a:solidFill>
+              </a:rPr>
+              <a:t>shop_id</a:t>
+            </a:r>
+            <a:r>
+              <a:rPr lang="en-US" dirty="0" smtClean="0">
+                <a:solidFill>
+                  <a:schemeClr val="tx1"/>
+                </a:solidFill>
+              </a:rPr>
+              <a:t>)</a:t>
+            </a:r>
+            <a:endParaRPr lang="en-US" dirty="0">
+              <a:solidFill>
+                <a:schemeClr val="tx1"/>
+              </a:solidFill>
+            </a:endParaRPr>
+          </a:p>
+          <a:p>
+            <a:pPr lvl="2">
+              <a:buFont typeface="Arial" panose="020B0604020202020204" pitchFamily="34" charset="0"/>
+              <a:buChar char="•"/>
+            </a:pPr>
+            <a:r>
+              <a:rPr lang="en-US" dirty="0" err="1" smtClean="0">
+                <a:solidFill>
+                  <a:schemeClr val="tx1"/>
+                </a:solidFill>
+              </a:rPr>
+              <a:t>get_coststory_by_shopid_prodid</a:t>
+            </a:r>
+            <a:r>
+              <a:rPr lang="en-US" dirty="0" smtClean="0">
+                <a:solidFill>
+                  <a:schemeClr val="tx1"/>
+                </a:solidFill>
+              </a:rPr>
+              <a:t>(</a:t>
+            </a:r>
+            <a:r>
+              <a:rPr lang="en-US" dirty="0" err="1" smtClean="0">
+                <a:solidFill>
+                  <a:schemeClr val="tx1"/>
+                </a:solidFill>
+              </a:rPr>
+              <a:t>shop_id</a:t>
+            </a:r>
+            <a:r>
+              <a:rPr lang="en-US" dirty="0" smtClean="0">
+                <a:solidFill>
+                  <a:schemeClr val="tx1"/>
+                </a:solidFill>
+              </a:rPr>
+              <a:t>, </a:t>
+            </a:r>
+            <a:r>
+              <a:rPr lang="en-US" dirty="0" err="1" smtClean="0">
+                <a:solidFill>
+                  <a:schemeClr val="tx1"/>
+                </a:solidFill>
+              </a:rPr>
+              <a:t>prod_id</a:t>
+            </a:r>
+            <a:r>
+              <a:rPr lang="en-US" dirty="0" smtClean="0">
+                <a:solidFill>
+                  <a:schemeClr val="tx1"/>
+                </a:solidFill>
+              </a:rPr>
+              <a:t>)</a:t>
+            </a:r>
+            <a:endParaRPr lang="en-US" dirty="0">
+              <a:solidFill>
+                <a:schemeClr val="tx1"/>
+              </a:solidFill>
+            </a:endParaRPr>
+          </a:p>
+          <a:p>
+            <a:pPr lvl="2">
+              <a:buFont typeface="Arial" panose="020B0604020202020204" pitchFamily="34" charset="0"/>
+              <a:buChar char="•"/>
+            </a:pPr>
+            <a:r>
+              <a:rPr lang="en-US" dirty="0" err="1" smtClean="0">
+                <a:solidFill>
+                  <a:schemeClr val="tx1"/>
+                </a:solidFill>
+              </a:rPr>
+              <a:t>get_salereceipts_by_shopid</a:t>
+            </a:r>
+            <a:r>
+              <a:rPr lang="en-US" dirty="0" smtClean="0">
+                <a:solidFill>
+                  <a:schemeClr val="tx1"/>
+                </a:solidFill>
+              </a:rPr>
+              <a:t>(</a:t>
+            </a:r>
+            <a:r>
+              <a:rPr lang="en-US" dirty="0" err="1" smtClean="0">
+                <a:solidFill>
+                  <a:schemeClr val="tx1"/>
+                </a:solidFill>
+              </a:rPr>
+              <a:t>shop_id</a:t>
+            </a:r>
+            <a:r>
+              <a:rPr lang="en-US" dirty="0" smtClean="0">
+                <a:solidFill>
+                  <a:schemeClr val="tx1"/>
+                </a:solidFill>
+              </a:rPr>
+              <a:t>)</a:t>
+            </a:r>
+            <a:endParaRPr lang="en-US" dirty="0">
+              <a:solidFill>
+                <a:schemeClr val="tx1"/>
+              </a:solidFill>
+            </a:endParaRPr>
+          </a:p>
+          <a:p>
+            <a:pPr lvl="2">
+              <a:buFont typeface="Arial" panose="020B0604020202020204" pitchFamily="34" charset="0"/>
+              <a:buChar char="•"/>
+            </a:pPr>
+            <a:r>
+              <a:rPr lang="en-US" dirty="0" err="1" smtClean="0">
+                <a:solidFill>
+                  <a:schemeClr val="tx1"/>
+                </a:solidFill>
+              </a:rPr>
+              <a:t>get_content_from_salereceipt</a:t>
+            </a:r>
+            <a:r>
+              <a:rPr lang="en-US" dirty="0" smtClean="0">
+                <a:solidFill>
+                  <a:schemeClr val="tx1"/>
+                </a:solidFill>
+              </a:rPr>
+              <a:t>(</a:t>
+            </a:r>
+            <a:r>
+              <a:rPr lang="en-US" dirty="0" err="1" smtClean="0">
+                <a:solidFill>
+                  <a:schemeClr val="tx1"/>
+                </a:solidFill>
+              </a:rPr>
+              <a:t>sr_id</a:t>
+            </a:r>
+            <a:r>
+              <a:rPr lang="en-US" dirty="0" smtClean="0">
+                <a:solidFill>
+                  <a:schemeClr val="tx1"/>
+                </a:solidFill>
+              </a:rPr>
+              <a:t>)</a:t>
+            </a:r>
+            <a:endParaRPr lang="ru-RU" dirty="0" smtClean="0">
+              <a:solidFill>
+                <a:schemeClr val="tx1"/>
+              </a:solidFill>
+            </a:endParaRPr>
           </a:p>
           <a:p>
             <a:pPr lvl="1">
@@ -7308,8 +7699,43 @@
                   <a:schemeClr val="tx1"/>
                 </a:solidFill>
               </a:rPr>
-              <a:t>Триггер для обновления истории цен</a:t>
-            </a:r>
+              <a:t>Триггер для обновления истории </a:t>
+            </a:r>
+            <a:r>
+              <a:rPr lang="ru-RU" dirty="0" smtClean="0">
+                <a:solidFill>
+                  <a:schemeClr val="tx1"/>
+                </a:solidFill>
+              </a:rPr>
+              <a:t>цен</a:t>
+            </a:r>
+          </a:p>
+          <a:p>
+            <a:pPr lvl="2">
+              <a:buFont typeface="Arial" panose="020B0604020202020204" pitchFamily="34" charset="0"/>
+              <a:buChar char="•"/>
+            </a:pPr>
+            <a:r>
+              <a:rPr lang="en-US" dirty="0" err="1">
+                <a:solidFill>
+                  <a:schemeClr val="tx1"/>
+                </a:solidFill>
+              </a:rPr>
+              <a:t>r</a:t>
+            </a:r>
+            <a:r>
+              <a:rPr lang="en-US" dirty="0" err="1" smtClean="0">
+                <a:solidFill>
+                  <a:schemeClr val="tx1"/>
+                </a:solidFill>
+              </a:rPr>
+              <a:t>emove_too_old_coststory</a:t>
+            </a:r>
+            <a:endParaRPr lang="ru-RU" dirty="0" smtClean="0">
+              <a:solidFill>
+                <a:schemeClr val="tx1"/>
+              </a:solidFill>
+            </a:endParaRPr>
           </a:p>
         </p:txBody>
       </p:sp>

</xml_diff>